<commit_message>
Update MQTT functionality for Rpi program, update pico remote for resistance/incline functionality
</commit_message>
<xml_diff>
--- a/Research/MQTT Schema.pptx
+++ b/Research/MQTT Schema.pptx
@@ -105,6 +105,11 @@
       </a:defRPr>
     </a:lvl9pPr>
   </p:defaultTextStyle>
+  <p:extLst>
+    <p:ext uri="{EFAFB233-063F-42B5-8137-9DF3F51BA10A}">
+      <p15:sldGuideLst xmlns:p15="http://schemas.microsoft.com/office/powerpoint/2012/main"/>
+    </p:ext>
+  </p:extLst>
 </p:presentation>
 </file>
 
@@ -257,7 +262,7 @@
           <a:p>
             <a:fld id="{8A1D0982-5D57-A049-968C-35DFA554FFFB}" type="datetimeFigureOut">
               <a:rPr lang="en-US" smtClean="0"/>
-              <a:t>8/30/22</a:t>
+              <a:t>8/9/2023</a:t>
             </a:fld>
             <a:endParaRPr lang="en-US"/>
           </a:p>
@@ -457,7 +462,7 @@
           <a:p>
             <a:fld id="{8A1D0982-5D57-A049-968C-35DFA554FFFB}" type="datetimeFigureOut">
               <a:rPr lang="en-US" smtClean="0"/>
-              <a:t>8/30/22</a:t>
+              <a:t>8/9/2023</a:t>
             </a:fld>
             <a:endParaRPr lang="en-US"/>
           </a:p>
@@ -667,7 +672,7 @@
           <a:p>
             <a:fld id="{8A1D0982-5D57-A049-968C-35DFA554FFFB}" type="datetimeFigureOut">
               <a:rPr lang="en-US" smtClean="0"/>
-              <a:t>8/30/22</a:t>
+              <a:t>8/9/2023</a:t>
             </a:fld>
             <a:endParaRPr lang="en-US"/>
           </a:p>
@@ -867,7 +872,7 @@
           <a:p>
             <a:fld id="{8A1D0982-5D57-A049-968C-35DFA554FFFB}" type="datetimeFigureOut">
               <a:rPr lang="en-US" smtClean="0"/>
-              <a:t>8/30/22</a:t>
+              <a:t>8/9/2023</a:t>
             </a:fld>
             <a:endParaRPr lang="en-US"/>
           </a:p>
@@ -1143,7 +1148,7 @@
           <a:p>
             <a:fld id="{8A1D0982-5D57-A049-968C-35DFA554FFFB}" type="datetimeFigureOut">
               <a:rPr lang="en-US" smtClean="0"/>
-              <a:t>8/30/22</a:t>
+              <a:t>8/9/2023</a:t>
             </a:fld>
             <a:endParaRPr lang="en-US"/>
           </a:p>
@@ -1411,7 +1416,7 @@
           <a:p>
             <a:fld id="{8A1D0982-5D57-A049-968C-35DFA554FFFB}" type="datetimeFigureOut">
               <a:rPr lang="en-US" smtClean="0"/>
-              <a:t>8/30/22</a:t>
+              <a:t>8/9/2023</a:t>
             </a:fld>
             <a:endParaRPr lang="en-US"/>
           </a:p>
@@ -1826,7 +1831,7 @@
           <a:p>
             <a:fld id="{8A1D0982-5D57-A049-968C-35DFA554FFFB}" type="datetimeFigureOut">
               <a:rPr lang="en-US" smtClean="0"/>
-              <a:t>8/30/22</a:t>
+              <a:t>8/9/2023</a:t>
             </a:fld>
             <a:endParaRPr lang="en-US"/>
           </a:p>
@@ -1968,7 +1973,7 @@
           <a:p>
             <a:fld id="{8A1D0982-5D57-A049-968C-35DFA554FFFB}" type="datetimeFigureOut">
               <a:rPr lang="en-US" smtClean="0"/>
-              <a:t>8/30/22</a:t>
+              <a:t>8/9/2023</a:t>
             </a:fld>
             <a:endParaRPr lang="en-US"/>
           </a:p>
@@ -2081,7 +2086,7 @@
           <a:p>
             <a:fld id="{8A1D0982-5D57-A049-968C-35DFA554FFFB}" type="datetimeFigureOut">
               <a:rPr lang="en-US" smtClean="0"/>
-              <a:t>8/30/22</a:t>
+              <a:t>8/9/2023</a:t>
             </a:fld>
             <a:endParaRPr lang="en-US"/>
           </a:p>
@@ -2394,7 +2399,7 @@
           <a:p>
             <a:fld id="{8A1D0982-5D57-A049-968C-35DFA554FFFB}" type="datetimeFigureOut">
               <a:rPr lang="en-US" smtClean="0"/>
-              <a:t>8/30/22</a:t>
+              <a:t>8/9/2023</a:t>
             </a:fld>
             <a:endParaRPr lang="en-US"/>
           </a:p>
@@ -2683,7 +2688,7 @@
           <a:p>
             <a:fld id="{8A1D0982-5D57-A049-968C-35DFA554FFFB}" type="datetimeFigureOut">
               <a:rPr lang="en-US" smtClean="0"/>
-              <a:t>8/30/22</a:t>
+              <a:t>8/9/2023</a:t>
             </a:fld>
             <a:endParaRPr lang="en-US"/>
           </a:p>
@@ -2926,7 +2931,7 @@
           <a:p>
             <a:fld id="{8A1D0982-5D57-A049-968C-35DFA554FFFB}" type="datetimeFigureOut">
               <a:rPr lang="en-US" smtClean="0"/>
-              <a:t>8/30/22</a:t>
+              <a:t>8/9/2023</a:t>
             </a:fld>
             <a:endParaRPr lang="en-US"/>
           </a:p>
@@ -3426,14 +3431,14 @@
           <p:nvPr>
             <p:extLst>
               <p:ext uri="{D42A27DB-BD31-4B8C-83A1-F6EECF244321}">
-                <p14:modId xmlns:p14="http://schemas.microsoft.com/office/powerpoint/2010/main" val="2963890115"/>
+                <p14:modId xmlns:p14="http://schemas.microsoft.com/office/powerpoint/2010/main" val="313460513"/>
               </p:ext>
             </p:extLst>
           </p:nvPr>
         </p:nvGraphicFramePr>
         <p:xfrm>
-          <a:off x="355008" y="1651959"/>
-          <a:ext cx="11574723" cy="4269780"/>
+          <a:off x="19878" y="1151130"/>
+          <a:ext cx="12119113" cy="5428575"/>
         </p:xfrm>
         <a:graphic>
           <a:graphicData uri="http://schemas.openxmlformats.org/drawingml/2006/table">
@@ -3442,35 +3447,35 @@
                 <a:tableStyleId>{5C22544A-7EE6-4342-B048-85BDC9FD1C3A}</a:tableStyleId>
               </a:tblPr>
               <a:tblGrid>
-                <a:gridCol w="2260601">
+                <a:gridCol w="2350928">
                   <a:extLst>
                     <a:ext uri="{9D8B030D-6E8A-4147-A177-3AD203B41FA5}">
                       <a16:colId xmlns:a16="http://schemas.microsoft.com/office/drawing/2014/main" val="4126290925"/>
                     </a:ext>
                   </a:extLst>
                 </a:gridCol>
-                <a:gridCol w="2892056">
+                <a:gridCol w="3033044">
                   <a:extLst>
                     <a:ext uri="{9D8B030D-6E8A-4147-A177-3AD203B41FA5}">
                       <a16:colId xmlns:a16="http://schemas.microsoft.com/office/drawing/2014/main" val="345111897"/>
                     </a:ext>
                   </a:extLst>
                 </a:gridCol>
-                <a:gridCol w="1775637">
+                <a:gridCol w="1862199">
                   <a:extLst>
                     <a:ext uri="{9D8B030D-6E8A-4147-A177-3AD203B41FA5}">
                       <a16:colId xmlns:a16="http://schemas.microsoft.com/office/drawing/2014/main" val="3051160826"/>
                     </a:ext>
                   </a:extLst>
                 </a:gridCol>
-                <a:gridCol w="1371600">
+                <a:gridCol w="1438465">
                   <a:extLst>
                     <a:ext uri="{9D8B030D-6E8A-4147-A177-3AD203B41FA5}">
                       <a16:colId xmlns:a16="http://schemas.microsoft.com/office/drawing/2014/main" val="577492316"/>
                     </a:ext>
                   </a:extLst>
                 </a:gridCol>
-                <a:gridCol w="3274829">
+                <a:gridCol w="3434477">
                   <a:extLst>
                     <a:ext uri="{9D8B030D-6E8A-4147-A177-3AD203B41FA5}">
                       <a16:colId xmlns:a16="http://schemas.microsoft.com/office/drawing/2014/main" val="1779477557"/>
@@ -3478,7 +3483,7 @@
                   </a:extLst>
                 </a:gridCol>
               </a:tblGrid>
-              <a:tr h="429300">
+              <a:tr h="436251">
                 <a:tc>
                   <a:txBody>
                     <a:bodyPr/>
@@ -3543,7 +3548,7 @@
                       <a:pPr algn="ctr"/>
                       <a:r>
                         <a:rPr lang="en-US" dirty="0"/>
-                        <a:t>Payload</a:t>
+                        <a:t>Payload example</a:t>
                       </a:r>
                     </a:p>
                   </a:txBody>
@@ -3555,15 +3560,15 @@
                   </a:ext>
                 </a:extLst>
               </a:tr>
-              <a:tr h="429300">
+              <a:tr h="650444">
                 <a:tc>
                   <a:txBody>
                     <a:bodyPr/>
                     <a:lstStyle/>
                     <a:p>
                       <a:r>
-                        <a:rPr lang="en-US" dirty="0"/>
-                        <a:t>bike/00001/speed </a:t>
+                        <a:rPr lang="en-US" sz="1400" dirty="0"/>
+                        <a:t>bike/000001/speed </a:t>
                       </a:r>
                     </a:p>
                   </a:txBody>
@@ -3575,7 +3580,7 @@
                     <a:lstStyle/>
                     <a:p>
                       <a:r>
-                        <a:rPr lang="en-US" dirty="0"/>
+                        <a:rPr lang="en-US" sz="1400" dirty="0"/>
                         <a:t>The speed a real bike would move </a:t>
                       </a:r>
                     </a:p>
@@ -3588,7 +3593,7 @@
                     <a:lstStyle/>
                     <a:p>
                       <a:r>
-                        <a:rPr lang="en-US" dirty="0"/>
+                        <a:rPr lang="en-US" sz="1400" dirty="0"/>
                         <a:t>m/s</a:t>
                       </a:r>
                     </a:p>
@@ -3601,7 +3606,7 @@
                     <a:lstStyle/>
                     <a:p>
                       <a:r>
-                        <a:rPr lang="en-US" dirty="0"/>
+                        <a:rPr lang="en-US" sz="1400" dirty="0"/>
                         <a:t>0 - 30</a:t>
                       </a:r>
                     </a:p>
@@ -3614,28 +3619,28 @@
                     <a:lstStyle/>
                     <a:p>
                       <a:r>
-                        <a:rPr lang="en-AU" dirty="0" err="1">
+                        <a:rPr lang="en-AU" sz="1400" dirty="0" err="1">
                           <a:effectLst/>
                         </a:rPr>
                         <a:t>ts</a:t>
                       </a:r>
                       <a:r>
-                        <a:rPr lang="en-AU" dirty="0">
+                        <a:rPr lang="en-AU" sz="1400" dirty="0">
                           <a:effectLst/>
                         </a:rPr>
                         <a:t>: 1</a:t>
                       </a:r>
                       <a:r>
-                        <a:rPr lang="en-AU" dirty="0"/>
+                        <a:rPr lang="en-AU" sz="1400" dirty="0"/>
                         <a:t>1662625808,</a:t>
                       </a:r>
                       <a:r>
-                        <a:rPr lang="en-AU" dirty="0">
+                        <a:rPr lang="en-AU" sz="1400" dirty="0">
                           <a:effectLst/>
                         </a:rPr>
                         <a:t> speed: 15</a:t>
                       </a:r>
-                      <a:endParaRPr lang="en-US" dirty="0"/>
+                      <a:endParaRPr lang="en-US" sz="1400" dirty="0"/>
                     </a:p>
                   </a:txBody>
                   <a:tcPr/>
@@ -3646,15 +3651,15 @@
                   </a:ext>
                 </a:extLst>
               </a:tr>
-              <a:tr h="429300">
+              <a:tr h="650444">
                 <a:tc>
                   <a:txBody>
                     <a:bodyPr/>
                     <a:lstStyle/>
                     <a:p>
                       <a:r>
-                        <a:rPr lang="en-US" dirty="0"/>
-                        <a:t>bike/00001/cadence </a:t>
+                        <a:rPr lang="en-US" sz="1400" dirty="0"/>
+                        <a:t>bike/000001/cadence </a:t>
                       </a:r>
                     </a:p>
                   </a:txBody>
@@ -3683,7 +3688,7 @@
                         <a:defRPr/>
                       </a:pPr>
                       <a:r>
-                        <a:rPr lang="en-AU" sz="1800" cap="none" spc="0" dirty="0">
+                        <a:rPr lang="en-AU" sz="1400" cap="none" spc="0" dirty="0">
                           <a:solidFill>
                             <a:schemeClr val="tx1"/>
                           </a:solidFill>
@@ -3691,7 +3696,7 @@
                         </a:rPr>
                         <a:t>How fast the pedals turn</a:t>
                       </a:r>
-                      <a:endParaRPr lang="en-AU" sz="1800" cap="none" spc="0" dirty="0">
+                      <a:endParaRPr lang="en-AU" sz="1400" cap="none" spc="0" dirty="0">
                         <a:solidFill>
                           <a:schemeClr val="tx1"/>
                         </a:solidFill>
@@ -3727,7 +3732,7 @@
                         <a:defRPr/>
                       </a:pPr>
                       <a:r>
-                        <a:rPr lang="en-AU" sz="1800" cap="none" spc="0" dirty="0">
+                        <a:rPr lang="en-AU" sz="1400" cap="none" spc="0" dirty="0">
                           <a:solidFill>
                             <a:schemeClr val="tx1"/>
                           </a:solidFill>
@@ -3765,7 +3770,7 @@
                         <a:defRPr/>
                       </a:pPr>
                       <a:r>
-                        <a:rPr lang="en-AU" sz="1800" cap="none" spc="0" dirty="0">
+                        <a:rPr lang="en-AU" sz="1400" cap="none" spc="0" dirty="0">
                           <a:solidFill>
                             <a:schemeClr val="tx1"/>
                           </a:solidFill>
@@ -3803,38 +3808,38 @@
                         <a:defRPr/>
                       </a:pPr>
                       <a:r>
-                        <a:rPr lang="en-AU" dirty="0" err="1">
+                        <a:rPr lang="en-AU" sz="1400" dirty="0" err="1">
                           <a:effectLst/>
                         </a:rPr>
                         <a:t>ts</a:t>
                       </a:r>
                       <a:r>
-                        <a:rPr lang="en-AU" dirty="0">
+                        <a:rPr lang="en-AU" sz="1400" dirty="0">
                           <a:effectLst/>
                         </a:rPr>
                         <a:t>: 1</a:t>
                       </a:r>
                       <a:r>
-                        <a:rPr lang="en-AU" dirty="0"/>
+                        <a:rPr lang="en-AU" sz="1400" dirty="0"/>
                         <a:t>1662625808,</a:t>
                       </a:r>
                       <a:r>
-                        <a:rPr lang="en-AU" dirty="0">
+                        <a:rPr lang="en-AU" sz="1400" dirty="0">
                           <a:effectLst/>
                         </a:rPr>
                         <a:t> </a:t>
                       </a:r>
                       <a:r>
-                        <a:rPr lang="en-US" dirty="0"/>
+                        <a:rPr lang="en-US" sz="1400" dirty="0"/>
                         <a:t>cadence</a:t>
                       </a:r>
                       <a:r>
-                        <a:rPr lang="en-AU" dirty="0">
+                        <a:rPr lang="en-AU" sz="1400" dirty="0">
                           <a:effectLst/>
                         </a:rPr>
                         <a:t>: 173</a:t>
                       </a:r>
-                      <a:endParaRPr lang="en-US" dirty="0"/>
+                      <a:endParaRPr lang="en-US" sz="1400" dirty="0"/>
                     </a:p>
                     <a:p>
                       <a:pPr marL="0" marR="0" lvl="0" indent="0" algn="l" defTabSz="914400" rtl="0" eaLnBrk="1" fontAlgn="auto" latinLnBrk="0" hangingPunct="1">
@@ -3854,7 +3859,7 @@
                         <a:tabLst/>
                         <a:defRPr/>
                       </a:pPr>
-                      <a:endParaRPr lang="en-AU" sz="1800" cap="none" spc="0" dirty="0">
+                      <a:endParaRPr lang="en-AU" sz="1400" cap="none" spc="0" dirty="0">
                         <a:solidFill>
                           <a:schemeClr val="tx1"/>
                         </a:solidFill>
@@ -3873,15 +3878,15 @@
                   </a:ext>
                 </a:extLst>
               </a:tr>
-              <a:tr h="429300">
+              <a:tr h="650444">
                 <a:tc>
                   <a:txBody>
                     <a:bodyPr/>
                     <a:lstStyle/>
                     <a:p>
                       <a:r>
-                        <a:rPr lang="en-US" dirty="0"/>
-                        <a:t>bike/00001/power </a:t>
+                        <a:rPr lang="en-US" sz="1400" dirty="0"/>
+                        <a:t>bike/000001/power </a:t>
                       </a:r>
                     </a:p>
                   </a:txBody>
@@ -3893,7 +3898,7 @@
                     <a:lstStyle/>
                     <a:p>
                       <a:r>
-                        <a:rPr lang="en-US" dirty="0"/>
+                        <a:rPr lang="en-US" sz="1400" dirty="0"/>
                         <a:t>How much energy is used/second </a:t>
                       </a:r>
                     </a:p>
@@ -3906,7 +3911,7 @@
                     <a:lstStyle/>
                     <a:p>
                       <a:r>
-                        <a:rPr lang="en-US" dirty="0"/>
+                        <a:rPr lang="en-US" sz="1400" dirty="0"/>
                         <a:t>Watts</a:t>
                       </a:r>
                     </a:p>
@@ -3919,7 +3924,7 @@
                     <a:lstStyle/>
                     <a:p>
                       <a:r>
-                        <a:rPr lang="en-US" dirty="0"/>
+                        <a:rPr lang="en-US" sz="1400" dirty="0"/>
                         <a:t>0 - 1000</a:t>
                       </a:r>
                     </a:p>
@@ -3949,31 +3954,31 @@
                         <a:defRPr/>
                       </a:pPr>
                       <a:r>
-                        <a:rPr lang="en-AU" dirty="0" err="1">
+                        <a:rPr lang="en-AU" sz="1400" dirty="0" err="1">
                           <a:effectLst/>
                         </a:rPr>
                         <a:t>ts</a:t>
                       </a:r>
                       <a:r>
-                        <a:rPr lang="en-AU" dirty="0">
+                        <a:rPr lang="en-AU" sz="1400" dirty="0">
                           <a:effectLst/>
                         </a:rPr>
                         <a:t>: 1</a:t>
                       </a:r>
                       <a:r>
-                        <a:rPr lang="en-AU" dirty="0"/>
+                        <a:rPr lang="en-AU" sz="1400" dirty="0"/>
                         <a:t>1662625808,</a:t>
                       </a:r>
                       <a:r>
-                        <a:rPr lang="en-AU" dirty="0">
+                        <a:rPr lang="en-AU" sz="1400" dirty="0">
                           <a:effectLst/>
                         </a:rPr>
                         <a:t> power: 665</a:t>
                       </a:r>
-                      <a:endParaRPr lang="en-US" dirty="0"/>
+                      <a:endParaRPr lang="en-US" sz="1400" dirty="0"/>
                     </a:p>
                     <a:p>
-                      <a:endParaRPr lang="en-US" dirty="0"/>
+                      <a:endParaRPr lang="en-US" sz="1400" dirty="0"/>
                     </a:p>
                   </a:txBody>
                   <a:tcPr/>
@@ -3984,15 +3989,15 @@
                   </a:ext>
                 </a:extLst>
               </a:tr>
-              <a:tr h="429300">
+              <a:tr h="653409">
                 <a:tc>
                   <a:txBody>
                     <a:bodyPr/>
                     <a:lstStyle/>
                     <a:p>
                       <a:r>
-                        <a:rPr lang="en-US" dirty="0"/>
-                        <a:t>bike/00001/heartrate </a:t>
+                        <a:rPr lang="en-US" sz="1400" dirty="0"/>
+                        <a:t>bike/000001/heartrate </a:t>
                       </a:r>
                     </a:p>
                   </a:txBody>
@@ -4004,7 +4009,7 @@
                     <a:lstStyle/>
                     <a:p>
                       <a:r>
-                        <a:rPr lang="en-US" dirty="0"/>
+                        <a:rPr lang="en-US" sz="1400" dirty="0"/>
                         <a:t>How fast the cyclist’s heart beats </a:t>
                       </a:r>
                     </a:p>
@@ -4017,7 +4022,7 @@
                     <a:lstStyle/>
                     <a:p>
                       <a:r>
-                        <a:rPr lang="en-US" dirty="0"/>
+                        <a:rPr lang="en-US" sz="1400" dirty="0"/>
                         <a:t>Beats/min</a:t>
                       </a:r>
                     </a:p>
@@ -4030,7 +4035,7 @@
                     <a:lstStyle/>
                     <a:p>
                       <a:r>
-                        <a:rPr lang="en-US" dirty="0"/>
+                        <a:rPr lang="en-US" sz="1400" dirty="0"/>
                         <a:t>0 - 220</a:t>
                       </a:r>
                     </a:p>
@@ -4060,31 +4065,31 @@
                         <a:defRPr/>
                       </a:pPr>
                       <a:r>
-                        <a:rPr lang="en-AU" dirty="0" err="1">
+                        <a:rPr lang="en-AU" sz="1400" dirty="0" err="1">
                           <a:effectLst/>
                         </a:rPr>
                         <a:t>ts</a:t>
                       </a:r>
                       <a:r>
-                        <a:rPr lang="en-AU" dirty="0">
+                        <a:rPr lang="en-AU" sz="1400" dirty="0">
                           <a:effectLst/>
                         </a:rPr>
                         <a:t>: 1</a:t>
                       </a:r>
                       <a:r>
-                        <a:rPr lang="en-AU" dirty="0"/>
+                        <a:rPr lang="en-AU" sz="1400" dirty="0"/>
                         <a:t>1662625808,</a:t>
                       </a:r>
                       <a:r>
-                        <a:rPr lang="en-AU" dirty="0">
+                        <a:rPr lang="en-AU" sz="1400" dirty="0">
                           <a:effectLst/>
                         </a:rPr>
                         <a:t> heartrate: 105</a:t>
                       </a:r>
-                      <a:endParaRPr lang="en-US" dirty="0"/>
+                      <a:endParaRPr lang="en-US" sz="1400" dirty="0"/>
                     </a:p>
                     <a:p>
-                      <a:endParaRPr lang="en-US" dirty="0"/>
+                      <a:endParaRPr lang="en-US" sz="1400" dirty="0"/>
                     </a:p>
                   </a:txBody>
                   <a:tcPr/>
@@ -4095,15 +4100,15 @@
                   </a:ext>
                 </a:extLst>
               </a:tr>
-              <a:tr h="429300">
+              <a:tr h="650444">
                 <a:tc>
                   <a:txBody>
                     <a:bodyPr/>
                     <a:lstStyle/>
                     <a:p>
                       <a:r>
-                        <a:rPr lang="en-US" dirty="0"/>
-                        <a:t>bike/00001/resistance </a:t>
+                        <a:rPr lang="en-US" sz="1400" dirty="0"/>
+                        <a:t>bike/000001/resistance/control </a:t>
                       </a:r>
                     </a:p>
                   </a:txBody>
@@ -4115,7 +4120,7 @@
                     <a:lstStyle/>
                     <a:p>
                       <a:r>
-                        <a:rPr lang="en-US" dirty="0"/>
+                        <a:rPr lang="en-US" sz="1400" dirty="0"/>
                         <a:t>Commands the bike to adjust the resistance </a:t>
                       </a:r>
                     </a:p>
@@ -4128,7 +4133,7 @@
                     <a:lstStyle/>
                     <a:p>
                       <a:r>
-                        <a:rPr lang="en-US" dirty="0"/>
+                        <a:rPr lang="en-US" sz="1400" dirty="0"/>
                         <a:t>Percentage</a:t>
                       </a:r>
                     </a:p>
@@ -4141,7 +4146,7 @@
                     <a:lstStyle/>
                     <a:p>
                       <a:r>
-                        <a:rPr lang="en-US" dirty="0"/>
+                        <a:rPr lang="en-US" sz="1400" dirty="0"/>
                         <a:t>0 - 100</a:t>
                       </a:r>
                     </a:p>
@@ -4171,41 +4176,41 @@
                         <a:defRPr/>
                       </a:pPr>
                       <a:r>
-                        <a:rPr lang="en-AU" dirty="0" err="1">
+                        <a:rPr lang="en-AU" sz="1400" dirty="0" err="1">
                           <a:effectLst/>
                         </a:rPr>
                         <a:t>ts</a:t>
                       </a:r>
                       <a:r>
-                        <a:rPr lang="en-AU" dirty="0">
+                        <a:rPr lang="en-AU" sz="1400" dirty="0">
                           <a:effectLst/>
                         </a:rPr>
                         <a:t>: 1</a:t>
                       </a:r>
                       <a:r>
-                        <a:rPr lang="en-AU" dirty="0"/>
+                        <a:rPr lang="en-AU" sz="1400" dirty="0"/>
                         <a:t>1662625808,</a:t>
                       </a:r>
                       <a:r>
-                        <a:rPr lang="en-AU" dirty="0">
+                        <a:rPr lang="en-AU" sz="1400" dirty="0">
                           <a:effectLst/>
                         </a:rPr>
                         <a:t> </a:t>
                       </a:r>
                       <a:r>
-                        <a:rPr lang="en-US" dirty="0"/>
+                        <a:rPr lang="en-US" sz="1400" dirty="0"/>
                         <a:t>resistance</a:t>
                       </a:r>
                       <a:r>
-                        <a:rPr lang="en-AU" dirty="0">
+                        <a:rPr lang="en-AU" sz="1400" dirty="0">
                           <a:effectLst/>
                         </a:rPr>
                         <a:t>: 80</a:t>
                       </a:r>
-                      <a:endParaRPr lang="en-US" dirty="0"/>
+                      <a:endParaRPr lang="en-US" sz="1400" dirty="0"/>
                     </a:p>
                     <a:p>
-                      <a:endParaRPr lang="en-US" dirty="0"/>
+                      <a:endParaRPr lang="en-US" sz="1400" dirty="0"/>
                     </a:p>
                   </a:txBody>
                   <a:tcPr/>
@@ -4216,15 +4221,15 @@
                   </a:ext>
                 </a:extLst>
               </a:tr>
-              <a:tr h="429300">
+              <a:tr h="650444">
                 <a:tc>
                   <a:txBody>
                     <a:bodyPr/>
                     <a:lstStyle/>
                     <a:p>
                       <a:r>
-                        <a:rPr lang="en-US" dirty="0"/>
-                        <a:t>bike/00001/incline </a:t>
+                        <a:rPr lang="en-US" sz="1400" dirty="0"/>
+                        <a:t>bike/000001/incline/control</a:t>
                       </a:r>
                     </a:p>
                   </a:txBody>
@@ -4236,7 +4241,7 @@
                     <a:lstStyle/>
                     <a:p>
                       <a:r>
-                        <a:rPr lang="en-US" dirty="0"/>
+                        <a:rPr lang="en-US" sz="1400" dirty="0"/>
                         <a:t>Commands the bike to adjust the incline </a:t>
                       </a:r>
                     </a:p>
@@ -4249,7 +4254,7 @@
                     <a:lstStyle/>
                     <a:p>
                       <a:r>
-                        <a:rPr lang="en-US" dirty="0"/>
+                        <a:rPr lang="en-US" sz="1400" dirty="0"/>
                         <a:t>Degrees</a:t>
                       </a:r>
                     </a:p>
@@ -4262,7 +4267,7 @@
                     <a:lstStyle/>
                     <a:p>
                       <a:r>
-                        <a:rPr lang="en-US" dirty="0"/>
+                        <a:rPr lang="en-US" sz="1400" dirty="0"/>
                         <a:t>-10 – 19 (step 0.5)</a:t>
                       </a:r>
                     </a:p>
@@ -4292,39 +4297,173 @@
                         <a:defRPr/>
                       </a:pPr>
                       <a:r>
-                        <a:rPr lang="en-AU" dirty="0" err="1">
+                        <a:rPr lang="en-AU" sz="1400" dirty="0" err="1">
                           <a:effectLst/>
                         </a:rPr>
                         <a:t>ts</a:t>
                       </a:r>
                       <a:r>
-                        <a:rPr lang="en-AU" dirty="0">
+                        <a:rPr lang="en-AU" sz="1400" dirty="0">
                           <a:effectLst/>
                         </a:rPr>
                         <a:t>: 1</a:t>
                       </a:r>
                       <a:r>
-                        <a:rPr lang="en-AU" dirty="0"/>
+                        <a:rPr lang="en-AU" sz="1400" dirty="0"/>
                         <a:t>1662625808,</a:t>
                       </a:r>
                       <a:r>
-                        <a:rPr lang="en-AU" dirty="0">
+                        <a:rPr lang="en-AU" sz="1400" dirty="0">
                           <a:effectLst/>
                         </a:rPr>
                         <a:t> </a:t>
                       </a:r>
                       <a:r>
-                        <a:rPr lang="en-US" dirty="0"/>
+                        <a:rPr lang="en-US" sz="1400" dirty="0"/>
                         <a:t>incline</a:t>
                       </a:r>
                       <a:r>
-                        <a:rPr lang="en-AU" dirty="0">
+                        <a:rPr lang="en-AU" sz="1400" dirty="0">
                           <a:effectLst/>
                         </a:rPr>
                         <a:t>: 2</a:t>
                       </a:r>
+                      <a:endParaRPr lang="en-US" sz="1400" dirty="0"/>
+                    </a:p>
+                    <a:p>
+                      <a:endParaRPr lang="en-US" sz="1400" dirty="0"/>
+                    </a:p>
+                  </a:txBody>
+                  <a:tcPr/>
+                </a:tc>
+                <a:extLst>
+                  <a:ext uri="{0D108BD9-81ED-4DB2-BD59-A6C34878D82A}">
+                    <a16:rowId xmlns:a16="http://schemas.microsoft.com/office/drawing/2014/main" val="1892610669"/>
+                  </a:ext>
+                </a:extLst>
+              </a:tr>
+              <a:tr h="650444">
+                <a:tc>
+                  <a:txBody>
+                    <a:bodyPr/>
+                    <a:lstStyle/>
+                    <a:p>
+                      <a:r>
+                        <a:rPr lang="en-US" sz="1400" dirty="0"/>
+                        <a:t>bike/000001/</a:t>
+                      </a:r>
+                      <a:r>
+                        <a:rPr lang="en-US" sz="1400" dirty="0" err="1"/>
+                        <a:t>startWorkout</a:t>
+                      </a:r>
+                      <a:endParaRPr lang="en-US" sz="1400" dirty="0"/>
+                    </a:p>
+                  </a:txBody>
+                  <a:tcPr/>
+                </a:tc>
+                <a:tc>
+                  <a:txBody>
+                    <a:bodyPr/>
+                    <a:lstStyle/>
+                    <a:p>
+                      <a:r>
+                        <a:rPr lang="en-US" sz="1400" dirty="0"/>
+                        <a:t>Commands the Pi to start the specific workout</a:t>
+                      </a:r>
+                    </a:p>
+                  </a:txBody>
+                  <a:tcPr/>
+                </a:tc>
+                <a:tc>
+                  <a:txBody>
+                    <a:bodyPr/>
+                    <a:lstStyle/>
+                    <a:p>
+                      <a:r>
+                        <a:rPr lang="en-US" sz="1400" dirty="0"/>
+                        <a:t>nil</a:t>
+                      </a:r>
+                    </a:p>
+                  </a:txBody>
+                  <a:tcPr/>
+                </a:tc>
+                <a:tc>
+                  <a:txBody>
+                    <a:bodyPr/>
+                    <a:lstStyle/>
+                    <a:p>
+                      <a:r>
+                        <a:rPr lang="en-US" sz="1400" dirty="0"/>
+                        <a:t>nil</a:t>
+                      </a:r>
+                    </a:p>
+                  </a:txBody>
+                  <a:tcPr/>
+                </a:tc>
+                <a:tc>
+                  <a:txBody>
+                    <a:bodyPr/>
+                    <a:lstStyle/>
+                    <a:p>
+                      <a:r>
+                        <a:rPr lang="en-US" sz="1400" dirty="0"/>
+                        <a:t>value: strength, intervals: 3, minutes: 5, resistance: 40</a:t>
+                      </a:r>
+                    </a:p>
+                  </a:txBody>
+                  <a:tcPr/>
+                </a:tc>
+                <a:extLst>
+                  <a:ext uri="{0D108BD9-81ED-4DB2-BD59-A6C34878D82A}">
+                    <a16:rowId xmlns:a16="http://schemas.microsoft.com/office/drawing/2014/main" val="3781303044"/>
+                  </a:ext>
+                </a:extLst>
+              </a:tr>
+              <a:tr h="436251">
+                <a:tc>
+                  <a:txBody>
+                    <a:bodyPr/>
+                    <a:lstStyle/>
+                    <a:p>
                       <a:endParaRPr lang="en-US" dirty="0"/>
                     </a:p>
+                  </a:txBody>
+                  <a:tcPr/>
+                </a:tc>
+                <a:tc>
+                  <a:txBody>
+                    <a:bodyPr/>
+                    <a:lstStyle/>
+                    <a:p>
+                      <a:endParaRPr lang="en-US" dirty="0"/>
+                    </a:p>
+                  </a:txBody>
+                  <a:tcPr/>
+                </a:tc>
+                <a:tc>
+                  <a:txBody>
+                    <a:bodyPr/>
+                    <a:lstStyle/>
+                    <a:p>
+                      <a:endParaRPr lang="en-US" dirty="0"/>
+                    </a:p>
+                  </a:txBody>
+                  <a:tcPr/>
+                </a:tc>
+                <a:tc>
+                  <a:txBody>
+                    <a:bodyPr/>
+                    <a:lstStyle/>
+                    <a:p>
+                      <a:endParaRPr lang="en-US" dirty="0"/>
+                    </a:p>
+                  </a:txBody>
+                  <a:tcPr/>
+                </a:tc>
+                <a:tc>
+                  <a:txBody>
+                    <a:bodyPr/>
+                    <a:lstStyle/>
                     <a:p>
                       <a:endParaRPr lang="en-US" dirty="0"/>
                     </a:p>
@@ -4333,7 +4472,7 @@
                 </a:tc>
                 <a:extLst>
                   <a:ext uri="{0D108BD9-81ED-4DB2-BD59-A6C34878D82A}">
-                    <a16:rowId xmlns:a16="http://schemas.microsoft.com/office/drawing/2014/main" val="1892610669"/>
+                    <a16:rowId xmlns:a16="http://schemas.microsoft.com/office/drawing/2014/main" val="1122683270"/>
                   </a:ext>
                 </a:extLst>
               </a:tr>

</xml_diff>